<commit_message>
Updated WATER DATA SA import, new BK Tidal BC, plotting, exports
</commit_message>
<xml_diff>
--- a/scripts/modeltools/exports/HCHB Exports.pptx
+++ b/scripts/modeltools/exports/HCHB Exports.pptx
@@ -278,7 +278,7 @@
           <a:p>
             <a:fld id="{16830FC5-F34D-4CE2-A5D2-97CB89A74524}" type="datetimeFigureOut">
               <a:rPr lang="en-AU" smtClean="0"/>
-              <a:t>11/05/2022</a:t>
+              <a:t>26/05/2022</a:t>
             </a:fld>
             <a:endParaRPr lang="en-AU"/>
           </a:p>
@@ -478,7 +478,7 @@
           <a:p>
             <a:fld id="{16830FC5-F34D-4CE2-A5D2-97CB89A74524}" type="datetimeFigureOut">
               <a:rPr lang="en-AU" smtClean="0"/>
-              <a:t>11/05/2022</a:t>
+              <a:t>26/05/2022</a:t>
             </a:fld>
             <a:endParaRPr lang="en-AU"/>
           </a:p>
@@ -688,7 +688,7 @@
           <a:p>
             <a:fld id="{16830FC5-F34D-4CE2-A5D2-97CB89A74524}" type="datetimeFigureOut">
               <a:rPr lang="en-AU" smtClean="0"/>
-              <a:t>11/05/2022</a:t>
+              <a:t>26/05/2022</a:t>
             </a:fld>
             <a:endParaRPr lang="en-AU"/>
           </a:p>
@@ -888,7 +888,7 @@
           <a:p>
             <a:fld id="{16830FC5-F34D-4CE2-A5D2-97CB89A74524}" type="datetimeFigureOut">
               <a:rPr lang="en-AU" smtClean="0"/>
-              <a:t>11/05/2022</a:t>
+              <a:t>26/05/2022</a:t>
             </a:fld>
             <a:endParaRPr lang="en-AU"/>
           </a:p>
@@ -1164,7 +1164,7 @@
           <a:p>
             <a:fld id="{16830FC5-F34D-4CE2-A5D2-97CB89A74524}" type="datetimeFigureOut">
               <a:rPr lang="en-AU" smtClean="0"/>
-              <a:t>11/05/2022</a:t>
+              <a:t>26/05/2022</a:t>
             </a:fld>
             <a:endParaRPr lang="en-AU"/>
           </a:p>
@@ -1432,7 +1432,7 @@
           <a:p>
             <a:fld id="{16830FC5-F34D-4CE2-A5D2-97CB89A74524}" type="datetimeFigureOut">
               <a:rPr lang="en-AU" smtClean="0"/>
-              <a:t>11/05/2022</a:t>
+              <a:t>26/05/2022</a:t>
             </a:fld>
             <a:endParaRPr lang="en-AU"/>
           </a:p>
@@ -1847,7 +1847,7 @@
           <a:p>
             <a:fld id="{16830FC5-F34D-4CE2-A5D2-97CB89A74524}" type="datetimeFigureOut">
               <a:rPr lang="en-AU" smtClean="0"/>
-              <a:t>11/05/2022</a:t>
+              <a:t>26/05/2022</a:t>
             </a:fld>
             <a:endParaRPr lang="en-AU"/>
           </a:p>
@@ -1989,7 +1989,7 @@
           <a:p>
             <a:fld id="{16830FC5-F34D-4CE2-A5D2-97CB89A74524}" type="datetimeFigureOut">
               <a:rPr lang="en-AU" smtClean="0"/>
-              <a:t>11/05/2022</a:t>
+              <a:t>26/05/2022</a:t>
             </a:fld>
             <a:endParaRPr lang="en-AU"/>
           </a:p>
@@ -2102,7 +2102,7 @@
           <a:p>
             <a:fld id="{16830FC5-F34D-4CE2-A5D2-97CB89A74524}" type="datetimeFigureOut">
               <a:rPr lang="en-AU" smtClean="0"/>
-              <a:t>11/05/2022</a:t>
+              <a:t>26/05/2022</a:t>
             </a:fld>
             <a:endParaRPr lang="en-AU"/>
           </a:p>
@@ -2415,7 +2415,7 @@
           <a:p>
             <a:fld id="{16830FC5-F34D-4CE2-A5D2-97CB89A74524}" type="datetimeFigureOut">
               <a:rPr lang="en-AU" smtClean="0"/>
-              <a:t>11/05/2022</a:t>
+              <a:t>26/05/2022</a:t>
             </a:fld>
             <a:endParaRPr lang="en-AU"/>
           </a:p>
@@ -2704,7 +2704,7 @@
           <a:p>
             <a:fld id="{16830FC5-F34D-4CE2-A5D2-97CB89A74524}" type="datetimeFigureOut">
               <a:rPr lang="en-AU" smtClean="0"/>
-              <a:t>11/05/2022</a:t>
+              <a:t>26/05/2022</a:t>
             </a:fld>
             <a:endParaRPr lang="en-AU"/>
           </a:p>
@@ -2947,7 +2947,7 @@
           <a:p>
             <a:fld id="{16830FC5-F34D-4CE2-A5D2-97CB89A74524}" type="datetimeFigureOut">
               <a:rPr lang="en-AU" smtClean="0"/>
-              <a:t>11/05/2022</a:t>
+              <a:t>26/05/2022</a:t>
             </a:fld>
             <a:endParaRPr lang="en-AU"/>
           </a:p>
@@ -26287,12 +26287,12 @@
                     <a:p>
                       <a:pPr algn="l" fontAlgn="ctr"/>
                       <a:r>
-                        <a:rPr lang="en-AU" sz="900" u="none" strike="noStrike">
+                        <a:rPr lang="en-AU" sz="900" u="none" strike="noStrike" dirty="0">
                           <a:effectLst/>
                         </a:rPr>
                         <a:t>Macroinvertebrates</a:t>
                       </a:r>
-                      <a:endParaRPr lang="en-AU" sz="900" b="0" i="0" u="none" strike="noStrike">
+                      <a:endParaRPr lang="en-AU" sz="900" b="0" i="0" u="none" strike="noStrike" dirty="0">
                         <a:solidFill>
                           <a:srgbClr val="000000"/>
                         </a:solidFill>
@@ -26310,12 +26310,12 @@
                     <a:p>
                       <a:pPr algn="l" fontAlgn="ctr"/>
                       <a:r>
-                        <a:rPr lang="en-AU" sz="900" u="none" strike="noStrike">
+                        <a:rPr lang="en-AU" sz="900" u="none" strike="noStrike" dirty="0">
                           <a:effectLst/>
                         </a:rPr>
                         <a:t>Water depth and salinity</a:t>
                       </a:r>
-                      <a:endParaRPr lang="en-AU" sz="900" b="0" i="0" u="none" strike="noStrike">
+                      <a:endParaRPr lang="en-AU" sz="900" b="0" i="0" u="none" strike="noStrike" dirty="0">
                         <a:solidFill>
                           <a:srgbClr val="000000"/>
                         </a:solidFill>

</xml_diff>